<commit_message>
Edit HighLevelSequenceDiagram and LogicClassDiagram to match current implementation
</commit_message>
<xml_diff>
--- a/docs/diagrams/HighLevelSequenceDiagrams.pptx
+++ b/docs/diagrams/HighLevelSequenceDiagrams.pptx
@@ -208,7 +208,7 @@
           <a:p>
             <a:fld id="{F5CC4B3F-88C1-4FFA-B1B6-F41C21DC6924}" type="datetimeFigureOut">
               <a:rPr lang="en-US" smtClean="0"/>
-              <a:t>9/21/2018</a:t>
+              <a:t>11/10/2018</a:t>
             </a:fld>
             <a:endParaRPr lang="en-US"/>
           </a:p>
@@ -654,7 +654,7 @@
           <a:p>
             <a:fld id="{78C97017-6FC3-485B-9764-EAC9E56C1D49}" type="datetimeFigureOut">
               <a:rPr lang="en-US" smtClean="0"/>
-              <a:t>9/21/2018</a:t>
+              <a:t>11/10/2018</a:t>
             </a:fld>
             <a:endParaRPr lang="en-US"/>
           </a:p>
@@ -822,7 +822,7 @@
           <a:p>
             <a:fld id="{78C97017-6FC3-485B-9764-EAC9E56C1D49}" type="datetimeFigureOut">
               <a:rPr lang="en-US" smtClean="0"/>
-              <a:t>9/21/2018</a:t>
+              <a:t>11/10/2018</a:t>
             </a:fld>
             <a:endParaRPr lang="en-US"/>
           </a:p>
@@ -1000,7 +1000,7 @@
           <a:p>
             <a:fld id="{78C97017-6FC3-485B-9764-EAC9E56C1D49}" type="datetimeFigureOut">
               <a:rPr lang="en-US" smtClean="0"/>
-              <a:t>9/21/2018</a:t>
+              <a:t>11/10/2018</a:t>
             </a:fld>
             <a:endParaRPr lang="en-US"/>
           </a:p>
@@ -1168,7 +1168,7 @@
           <a:p>
             <a:fld id="{78C97017-6FC3-485B-9764-EAC9E56C1D49}" type="datetimeFigureOut">
               <a:rPr lang="en-US" smtClean="0"/>
-              <a:t>9/21/2018</a:t>
+              <a:t>11/10/2018</a:t>
             </a:fld>
             <a:endParaRPr lang="en-US"/>
           </a:p>
@@ -1413,7 +1413,7 @@
           <a:p>
             <a:fld id="{78C97017-6FC3-485B-9764-EAC9E56C1D49}" type="datetimeFigureOut">
               <a:rPr lang="en-US" smtClean="0"/>
-              <a:t>9/21/2018</a:t>
+              <a:t>11/10/2018</a:t>
             </a:fld>
             <a:endParaRPr lang="en-US"/>
           </a:p>
@@ -1698,7 +1698,7 @@
           <a:p>
             <a:fld id="{78C97017-6FC3-485B-9764-EAC9E56C1D49}" type="datetimeFigureOut">
               <a:rPr lang="en-US" smtClean="0"/>
-              <a:t>9/21/2018</a:t>
+              <a:t>11/10/2018</a:t>
             </a:fld>
             <a:endParaRPr lang="en-US"/>
           </a:p>
@@ -2117,7 +2117,7 @@
           <a:p>
             <a:fld id="{78C97017-6FC3-485B-9764-EAC9E56C1D49}" type="datetimeFigureOut">
               <a:rPr lang="en-US" smtClean="0"/>
-              <a:t>9/21/2018</a:t>
+              <a:t>11/10/2018</a:t>
             </a:fld>
             <a:endParaRPr lang="en-US"/>
           </a:p>
@@ -2234,7 +2234,7 @@
           <a:p>
             <a:fld id="{78C97017-6FC3-485B-9764-EAC9E56C1D49}" type="datetimeFigureOut">
               <a:rPr lang="en-US" smtClean="0"/>
-              <a:t>9/21/2018</a:t>
+              <a:t>11/10/2018</a:t>
             </a:fld>
             <a:endParaRPr lang="en-US"/>
           </a:p>
@@ -2329,7 +2329,7 @@
           <a:p>
             <a:fld id="{78C97017-6FC3-485B-9764-EAC9E56C1D49}" type="datetimeFigureOut">
               <a:rPr lang="en-US" smtClean="0"/>
-              <a:t>9/21/2018</a:t>
+              <a:t>11/10/2018</a:t>
             </a:fld>
             <a:endParaRPr lang="en-US"/>
           </a:p>
@@ -2604,7 +2604,7 @@
           <a:p>
             <a:fld id="{78C97017-6FC3-485B-9764-EAC9E56C1D49}" type="datetimeFigureOut">
               <a:rPr lang="en-US" smtClean="0"/>
-              <a:t>9/21/2018</a:t>
+              <a:t>11/10/2018</a:t>
             </a:fld>
             <a:endParaRPr lang="en-US"/>
           </a:p>
@@ -2856,7 +2856,7 @@
           <a:p>
             <a:fld id="{78C97017-6FC3-485B-9764-EAC9E56C1D49}" type="datetimeFigureOut">
               <a:rPr lang="en-US" smtClean="0"/>
-              <a:t>9/21/2018</a:t>
+              <a:t>11/10/2018</a:t>
             </a:fld>
             <a:endParaRPr lang="en-US"/>
           </a:p>
@@ -3067,7 +3067,7 @@
           <a:p>
             <a:fld id="{78C97017-6FC3-485B-9764-EAC9E56C1D49}" type="datetimeFigureOut">
               <a:rPr lang="en-US" smtClean="0"/>
-              <a:t>9/21/2018</a:t>
+              <a:t>11/10/2018</a:t>
             </a:fld>
             <a:endParaRPr lang="en-US"/>
           </a:p>
@@ -4229,23 +4229,7 @@
                   <a:srgbClr val="0070C0"/>
                 </a:solidFill>
               </a:rPr>
-              <a:t>execute(“</a:t>
-            </a:r>
-            <a:r>
-              <a:rPr lang="en-US" sz="1400" dirty="0" err="1">
-                <a:solidFill>
-                  <a:srgbClr val="0070C0"/>
-                </a:solidFill>
-              </a:rPr>
-              <a:t>delete_friend</a:t>
-            </a:r>
-            <a:r>
-              <a:rPr lang="en-US" sz="1400" dirty="0">
-                <a:solidFill>
-                  <a:srgbClr val="0070C0"/>
-                </a:solidFill>
-              </a:rPr>
-              <a:t> 1”)</a:t>
+              <a:t>execute(“delete 1”)</a:t>
             </a:r>
           </a:p>
         </p:txBody>
@@ -4309,20 +4293,12 @@
           <a:lstStyle/>
           <a:p>
             <a:r>
-              <a:rPr lang="en-US" sz="1400" dirty="0" err="1">
-                <a:solidFill>
-                  <a:srgbClr val="7030A0"/>
-                </a:solidFill>
-              </a:rPr>
-              <a:t>deletePerson</a:t>
-            </a:r>
-            <a:r>
               <a:rPr lang="en-US" sz="1400" dirty="0">
                 <a:solidFill>
                   <a:srgbClr val="7030A0"/>
                 </a:solidFill>
               </a:rPr>
-              <a:t>(p)</a:t>
+              <a:t>delete(p)</a:t>
             </a:r>
           </a:p>
         </p:txBody>
@@ -4360,14 +4336,14 @@
               <a:t>post(</a:t>
             </a:r>
             <a:r>
-              <a:rPr lang="en-US" sz="1400">
+              <a:rPr lang="en-US" sz="1400" dirty="0" err="1">
                 <a:solidFill>
                   <a:schemeClr val="accent5">
                     <a:lumMod val="75000"/>
                   </a:schemeClr>
                 </a:solidFill>
               </a:rPr>
-              <a:t>EriumChangedEvent</a:t>
+              <a:t>AddressBookChangedEvent</a:t>
             </a:r>
             <a:r>
               <a:rPr lang="en-US" sz="1400" dirty="0">
@@ -4934,7 +4910,7 @@
                   </a:schemeClr>
                 </a:solidFill>
               </a:rPr>
-              <a:t>EriumChangedEvent</a:t>
+              <a:t>AddressBookChangedEvent</a:t>
             </a:r>
             <a:r>
               <a:rPr lang="en-US" sz="1400" dirty="0">
@@ -5299,7 +5275,7 @@
                   </a:schemeClr>
                 </a:solidFill>
               </a:rPr>
-              <a:t>handleEriumChangedEvent</a:t>
+              <a:t>handleAddressBookChangedEvent</a:t>
             </a:r>
             <a:r>
               <a:rPr lang="en-US" sz="1400" dirty="0">
@@ -5603,7 +5579,7 @@
                   <a:srgbClr val="00B050"/>
                 </a:solidFill>
               </a:rPr>
-              <a:t>handleEriumChangedEvent</a:t>
+              <a:t>handleAddressBookChangedEvent</a:t>
             </a:r>
             <a:r>
               <a:rPr lang="en-US" sz="1400" dirty="0">

</xml_diff>